<commit_message>
updated class on AMQP
</commit_message>
<xml_diff>
--- a/doc/advanced/slides/lesson_10.pptx
+++ b/doc/advanced/slides/lesson_10.pptx
@@ -7,7 +7,7 @@
     <p:sldMasterId id="2147483672" r:id="rId3"/>
   </p:sldMasterIdLst>
   <p:notesMasterIdLst>
-    <p:notesMasterId r:id="rId14"/>
+    <p:notesMasterId r:id="rId15"/>
   </p:notesMasterIdLst>
   <p:sldIdLst>
     <p:sldId id="307" r:id="rId4"/>
@@ -16,10 +16,11 @@
     <p:sldId id="314" r:id="rId7"/>
     <p:sldId id="316" r:id="rId8"/>
     <p:sldId id="317" r:id="rId9"/>
-    <p:sldId id="318" r:id="rId10"/>
-    <p:sldId id="319" r:id="rId11"/>
-    <p:sldId id="320" r:id="rId12"/>
-    <p:sldId id="313" r:id="rId13"/>
+    <p:sldId id="321" r:id="rId10"/>
+    <p:sldId id="318" r:id="rId11"/>
+    <p:sldId id="319" r:id="rId12"/>
+    <p:sldId id="320" r:id="rId13"/>
+    <p:sldId id="313" r:id="rId14"/>
   </p:sldIdLst>
   <p:sldSz cx="12192000" cy="6858000"/>
   <p:notesSz cx="6858000" cy="9144000"/>
@@ -220,7 +221,7 @@
           <a:p>
             <a:fld id="{060F4727-23A3-441E-BA41-9534DD80814F}" type="datetimeFigureOut">
               <a:rPr lang="en-US" smtClean="0"/>
-              <a:t>23-Oct-19</a:t>
+              <a:t>10/1/20</a:t>
             </a:fld>
             <a:endParaRPr lang="en-US"/>
           </a:p>
@@ -636,7 +637,7 @@
           <a:p>
             <a:fld id="{11ADBA3B-C92D-4CFA-B969-3AFAA1A6C2A1}" type="slidenum">
               <a:rPr lang="en-US" smtClean="0"/>
-              <a:t>7</a:t>
+              <a:t>8</a:t>
             </a:fld>
             <a:endParaRPr lang="en-US"/>
           </a:p>
@@ -720,7 +721,7 @@
           <a:p>
             <a:fld id="{11ADBA3B-C92D-4CFA-B969-3AFAA1A6C2A1}" type="slidenum">
               <a:rPr lang="en-US" smtClean="0"/>
-              <a:t>8</a:t>
+              <a:t>9</a:t>
             </a:fld>
             <a:endParaRPr lang="en-US"/>
           </a:p>
@@ -851,7 +852,7 @@
                 <a:tabLst/>
                 <a:defRPr/>
               </a:pPr>
-              <a:t>10</a:t>
+              <a:t>11</a:t>
             </a:fld>
             <a:endParaRPr kumimoji="0" lang="en-US" sz="1200" b="0" i="0" u="none" strike="noStrike" kern="1200" cap="none" spc="0" normalizeH="0" baseline="0" noProof="0">
               <a:ln>
@@ -1012,7 +1013,7 @@
           <a:p>
             <a:fld id="{6D7D1AC5-EDA8-4631-9228-9906422CEF8D}" type="datetimeFigureOut">
               <a:rPr lang="en-US" smtClean="0"/>
-              <a:t>23-Oct-19</a:t>
+              <a:t>10/1/20</a:t>
             </a:fld>
             <a:endParaRPr lang="en-US"/>
           </a:p>
@@ -1180,7 +1181,7 @@
           <a:p>
             <a:fld id="{6D7D1AC5-EDA8-4631-9228-9906422CEF8D}" type="datetimeFigureOut">
               <a:rPr lang="en-US" smtClean="0"/>
-              <a:t>23-Oct-19</a:t>
+              <a:t>10/1/20</a:t>
             </a:fld>
             <a:endParaRPr lang="en-US"/>
           </a:p>
@@ -1358,7 +1359,7 @@
           <a:p>
             <a:fld id="{6D7D1AC5-EDA8-4631-9228-9906422CEF8D}" type="datetimeFigureOut">
               <a:rPr lang="en-US" smtClean="0"/>
-              <a:t>23-Oct-19</a:t>
+              <a:t>10/1/20</a:t>
             </a:fld>
             <a:endParaRPr lang="en-US"/>
           </a:p>
@@ -1597,7 +1598,7 @@
                 <a:tabLst/>
                 <a:defRPr/>
               </a:pPr>
-              <a:t>23-Oct-19</a:t>
+              <a:t>10/1/20</a:t>
             </a:fld>
             <a:endParaRPr kumimoji="0" lang="en-US" sz="1200" b="0" i="0" u="none" strike="noStrike" kern="1200" cap="none" spc="0" normalizeH="0" baseline="0" noProof="0">
               <a:ln>
@@ -1936,7 +1937,7 @@
                 <a:tabLst/>
                 <a:defRPr/>
               </a:pPr>
-              <a:t>23-Oct-19</a:t>
+              <a:t>10/1/20</a:t>
             </a:fld>
             <a:endParaRPr kumimoji="0" lang="en-US" sz="1200" b="0" i="0" u="none" strike="noStrike" kern="1200" cap="none" spc="0" normalizeH="0" baseline="0" noProof="0">
               <a:ln>
@@ -2341,7 +2342,7 @@
                 <a:tabLst/>
                 <a:defRPr/>
               </a:pPr>
-              <a:t>23-Oct-19</a:t>
+              <a:t>10/1/20</a:t>
             </a:fld>
             <a:endParaRPr kumimoji="0" lang="en-US" sz="1200" b="0" i="0" u="none" strike="noStrike" kern="1200" cap="none" spc="0" normalizeH="0" baseline="0" noProof="0">
               <a:ln>
@@ -2730,7 +2731,7 @@
                 <a:tabLst/>
                 <a:defRPr/>
               </a:pPr>
-              <a:t>23-Oct-19</a:t>
+              <a:t>10/1/20</a:t>
             </a:fld>
             <a:endParaRPr kumimoji="0" lang="en-US" sz="1200" b="0" i="0" u="none" strike="noStrike" kern="1200" cap="none" spc="0" normalizeH="0" baseline="0" noProof="0">
               <a:ln>
@@ -3254,7 +3255,7 @@
                 <a:tabLst/>
                 <a:defRPr/>
               </a:pPr>
-              <a:t>23-Oct-19</a:t>
+              <a:t>10/1/20</a:t>
             </a:fld>
             <a:endParaRPr kumimoji="0" lang="en-US" sz="1200" b="0" i="0" u="none" strike="noStrike" kern="1200" cap="none" spc="0" normalizeH="0" baseline="0" noProof="0">
               <a:ln>
@@ -3531,7 +3532,7 @@
                 <a:tabLst/>
                 <a:defRPr/>
               </a:pPr>
-              <a:t>23-Oct-19</a:t>
+              <a:t>10/1/20</a:t>
             </a:fld>
             <a:endParaRPr kumimoji="0" lang="en-US" sz="1200" b="0" i="0" u="none" strike="noStrike" kern="1200" cap="none" spc="0" normalizeH="0" baseline="0" noProof="0">
               <a:ln>
@@ -3786,7 +3787,7 @@
                 <a:tabLst/>
                 <a:defRPr/>
               </a:pPr>
-              <a:t>23-Oct-19</a:t>
+              <a:t>10/1/20</a:t>
             </a:fld>
             <a:endParaRPr kumimoji="0" lang="en-US" sz="1200" b="0" i="0" u="none" strike="noStrike" kern="1200" cap="none" spc="0" normalizeH="0" baseline="0" noProof="0">
               <a:ln>
@@ -4221,7 +4222,7 @@
                 <a:tabLst/>
                 <a:defRPr/>
               </a:pPr>
-              <a:t>23-Oct-19</a:t>
+              <a:t>10/1/20</a:t>
             </a:fld>
             <a:endParaRPr kumimoji="0" lang="en-US" sz="1200" b="0" i="0" u="none" strike="noStrike" kern="1200" cap="none" spc="0" normalizeH="0" baseline="0" noProof="0">
               <a:ln>
@@ -4534,7 +4535,7 @@
           <a:p>
             <a:fld id="{6D7D1AC5-EDA8-4631-9228-9906422CEF8D}" type="datetimeFigureOut">
               <a:rPr lang="en-US" smtClean="0"/>
-              <a:t>23-Oct-19</a:t>
+              <a:t>10/1/20</a:t>
             </a:fld>
             <a:endParaRPr lang="en-US"/>
           </a:p>
@@ -4835,7 +4836,7 @@
                 <a:tabLst/>
                 <a:defRPr/>
               </a:pPr>
-              <a:t>23-Oct-19</a:t>
+              <a:t>10/1/20</a:t>
             </a:fld>
             <a:endParaRPr kumimoji="0" lang="en-US" sz="1200" b="0" i="0" u="none" strike="noStrike" kern="1200" cap="none" spc="0" normalizeH="0" baseline="0" noProof="0">
               <a:ln>
@@ -5163,7 +5164,7 @@
                 <a:tabLst/>
                 <a:defRPr/>
               </a:pPr>
-              <a:t>23-Oct-19</a:t>
+              <a:t>10/1/20</a:t>
             </a:fld>
             <a:endParaRPr kumimoji="0" lang="en-US" sz="1200" b="0" i="0" u="none" strike="noStrike" kern="1200" cap="none" spc="0" normalizeH="0" baseline="0" noProof="0">
               <a:ln>
@@ -5501,7 +5502,7 @@
                 <a:tabLst/>
                 <a:defRPr/>
               </a:pPr>
-              <a:t>23-Oct-19</a:t>
+              <a:t>10/1/20</a:t>
             </a:fld>
             <a:endParaRPr kumimoji="0" lang="en-US" sz="1200" b="0" i="0" u="none" strike="noStrike" kern="1200" cap="none" spc="0" normalizeH="0" baseline="0" noProof="0">
               <a:ln>
@@ -5851,7 +5852,7 @@
                 <a:tabLst/>
                 <a:defRPr/>
               </a:pPr>
-              <a:t>23-Oct-19</a:t>
+              <a:t>10/1/20</a:t>
             </a:fld>
             <a:endParaRPr kumimoji="0" lang="en-US" sz="1200" b="0" i="0" u="none" strike="noStrike" kern="1200" cap="none" spc="0" normalizeH="0" baseline="0" noProof="0">
               <a:ln>
@@ -6190,7 +6191,7 @@
                 <a:tabLst/>
                 <a:defRPr/>
               </a:pPr>
-              <a:t>23-Oct-19</a:t>
+              <a:t>10/1/20</a:t>
             </a:fld>
             <a:endParaRPr kumimoji="0" lang="en-US" sz="1200" b="0" i="0" u="none" strike="noStrike" kern="1200" cap="none" spc="0" normalizeH="0" baseline="0" noProof="0">
               <a:ln>
@@ -6595,7 +6596,7 @@
                 <a:tabLst/>
                 <a:defRPr/>
               </a:pPr>
-              <a:t>23-Oct-19</a:t>
+              <a:t>10/1/20</a:t>
             </a:fld>
             <a:endParaRPr kumimoji="0" lang="en-US" sz="1200" b="0" i="0" u="none" strike="noStrike" kern="1200" cap="none" spc="0" normalizeH="0" baseline="0" noProof="0">
               <a:ln>
@@ -6984,7 +6985,7 @@
                 <a:tabLst/>
                 <a:defRPr/>
               </a:pPr>
-              <a:t>23-Oct-19</a:t>
+              <a:t>10/1/20</a:t>
             </a:fld>
             <a:endParaRPr kumimoji="0" lang="en-US" sz="1200" b="0" i="0" u="none" strike="noStrike" kern="1200" cap="none" spc="0" normalizeH="0" baseline="0" noProof="0">
               <a:ln>
@@ -7508,7 +7509,7 @@
                 <a:tabLst/>
                 <a:defRPr/>
               </a:pPr>
-              <a:t>23-Oct-19</a:t>
+              <a:t>10/1/20</a:t>
             </a:fld>
             <a:endParaRPr kumimoji="0" lang="en-US" sz="1200" b="0" i="0" u="none" strike="noStrike" kern="1200" cap="none" spc="0" normalizeH="0" baseline="0" noProof="0">
               <a:ln>
@@ -7785,7 +7786,7 @@
                 <a:tabLst/>
                 <a:defRPr/>
               </a:pPr>
-              <a:t>23-Oct-19</a:t>
+              <a:t>10/1/20</a:t>
             </a:fld>
             <a:endParaRPr kumimoji="0" lang="en-US" sz="1200" b="0" i="0" u="none" strike="noStrike" kern="1200" cap="none" spc="0" normalizeH="0" baseline="0" noProof="0">
               <a:ln>
@@ -8040,7 +8041,7 @@
                 <a:tabLst/>
                 <a:defRPr/>
               </a:pPr>
-              <a:t>23-Oct-19</a:t>
+              <a:t>10/1/20</a:t>
             </a:fld>
             <a:endParaRPr kumimoji="0" lang="en-US" sz="1200" b="0" i="0" u="none" strike="noStrike" kern="1200" cap="none" spc="0" normalizeH="0" baseline="0" noProof="0">
               <a:ln>
@@ -8396,7 +8397,7 @@
           <a:p>
             <a:fld id="{6D7D1AC5-EDA8-4631-9228-9906422CEF8D}" type="datetimeFigureOut">
               <a:rPr lang="en-US" smtClean="0"/>
-              <a:t>23-Oct-19</a:t>
+              <a:t>10/1/20</a:t>
             </a:fld>
             <a:endParaRPr lang="en-US"/>
           </a:p>
@@ -8720,7 +8721,7 @@
                 <a:tabLst/>
                 <a:defRPr/>
               </a:pPr>
-              <a:t>23-Oct-19</a:t>
+              <a:t>10/1/20</a:t>
             </a:fld>
             <a:endParaRPr kumimoji="0" lang="en-US" sz="1200" b="0" i="0" u="none" strike="noStrike" kern="1200" cap="none" spc="0" normalizeH="0" baseline="0" noProof="0">
               <a:ln>
@@ -9132,7 +9133,7 @@
                 <a:tabLst/>
                 <a:defRPr/>
               </a:pPr>
-              <a:t>23-Oct-19</a:t>
+              <a:t>10/1/20</a:t>
             </a:fld>
             <a:endParaRPr kumimoji="0" lang="en-US" sz="1200" b="0" i="0" u="none" strike="noStrike" kern="1200" cap="none" spc="0" normalizeH="0" baseline="0" noProof="0">
               <a:ln>
@@ -9460,7 +9461,7 @@
                 <a:tabLst/>
                 <a:defRPr/>
               </a:pPr>
-              <a:t>23-Oct-19</a:t>
+              <a:t>10/1/20</a:t>
             </a:fld>
             <a:endParaRPr kumimoji="0" lang="en-US" sz="1200" b="0" i="0" u="none" strike="noStrike" kern="1200" cap="none" spc="0" normalizeH="0" baseline="0" noProof="0">
               <a:ln>
@@ -9798,7 +9799,7 @@
                 <a:tabLst/>
                 <a:defRPr/>
               </a:pPr>
-              <a:t>23-Oct-19</a:t>
+              <a:t>10/1/20</a:t>
             </a:fld>
             <a:endParaRPr kumimoji="0" lang="en-US" sz="1200" b="0" i="0" u="none" strike="noStrike" kern="1200" cap="none" spc="0" normalizeH="0" baseline="0" noProof="0">
               <a:ln>
@@ -10138,7 +10139,7 @@
           <a:p>
             <a:fld id="{6D7D1AC5-EDA8-4631-9228-9906422CEF8D}" type="datetimeFigureOut">
               <a:rPr lang="en-US" smtClean="0"/>
-              <a:t>23-Oct-19</a:t>
+              <a:t>10/1/20</a:t>
             </a:fld>
             <a:endParaRPr lang="en-US"/>
           </a:p>
@@ -10502,7 +10503,7 @@
           <a:p>
             <a:fld id="{6D7D1AC5-EDA8-4631-9228-9906422CEF8D}" type="datetimeFigureOut">
               <a:rPr lang="en-US" smtClean="0"/>
-              <a:t>23-Oct-19</a:t>
+              <a:t>10/1/20</a:t>
             </a:fld>
             <a:endParaRPr lang="en-US"/>
           </a:p>
@@ -10619,7 +10620,7 @@
           <a:p>
             <a:fld id="{6D7D1AC5-EDA8-4631-9228-9906422CEF8D}" type="datetimeFigureOut">
               <a:rPr lang="en-US" smtClean="0"/>
-              <a:t>23-Oct-19</a:t>
+              <a:t>10/1/20</a:t>
             </a:fld>
             <a:endParaRPr lang="en-US"/>
           </a:p>
@@ -10714,7 +10715,7 @@
           <a:p>
             <a:fld id="{6D7D1AC5-EDA8-4631-9228-9906422CEF8D}" type="datetimeFigureOut">
               <a:rPr lang="en-US" smtClean="0"/>
-              <a:t>23-Oct-19</a:t>
+              <a:t>10/1/20</a:t>
             </a:fld>
             <a:endParaRPr lang="en-US"/>
           </a:p>
@@ -10989,7 +10990,7 @@
           <a:p>
             <a:fld id="{6D7D1AC5-EDA8-4631-9228-9906422CEF8D}" type="datetimeFigureOut">
               <a:rPr lang="en-US" smtClean="0"/>
-              <a:t>23-Oct-19</a:t>
+              <a:t>10/1/20</a:t>
             </a:fld>
             <a:endParaRPr lang="en-US"/>
           </a:p>
@@ -11241,7 +11242,7 @@
           <a:p>
             <a:fld id="{6D7D1AC5-EDA8-4631-9228-9906422CEF8D}" type="datetimeFigureOut">
               <a:rPr lang="en-US" smtClean="0"/>
-              <a:t>23-Oct-19</a:t>
+              <a:t>10/1/20</a:t>
             </a:fld>
             <a:endParaRPr lang="en-US"/>
           </a:p>
@@ -11452,7 +11453,7 @@
           <a:p>
             <a:fld id="{6D7D1AC5-EDA8-4631-9228-9906422CEF8D}" type="datetimeFigureOut">
               <a:rPr lang="en-US" smtClean="0"/>
-              <a:t>23-Oct-19</a:t>
+              <a:t>10/1/20</a:t>
             </a:fld>
             <a:endParaRPr lang="en-US"/>
           </a:p>
@@ -12039,7 +12040,7 @@
                 <a:tabLst/>
                 <a:defRPr/>
               </a:pPr>
-              <a:t>23-Oct-19</a:t>
+              <a:t>10/1/20</a:t>
             </a:fld>
             <a:endParaRPr kumimoji="0" lang="en-US" sz="1200" b="0" i="0" u="none" strike="noStrike" kern="1200" cap="none" spc="0" normalizeH="0" baseline="0" noProof="0">
               <a:ln>
@@ -12737,7 +12738,7 @@
                 <a:tabLst/>
                 <a:defRPr/>
               </a:pPr>
-              <a:t>23-Oct-19</a:t>
+              <a:t>10/1/20</a:t>
             </a:fld>
             <a:endParaRPr kumimoji="0" lang="en-US" sz="1200" b="0" i="0" u="none" strike="noStrike" kern="1200" cap="none" spc="0" normalizeH="0" baseline="0" noProof="0">
               <a:ln>
@@ -13291,24 +13292,12 @@
             <a:br>
               <a:rPr lang="en-US" sz="7200" dirty="0"/>
             </a:br>
-            <a:r>
-              <a:rPr lang="en-US" sz="7200" dirty="0"/>
-              <a:t/>
-            </a:r>
             <a:br>
               <a:rPr lang="en-US" sz="7200" dirty="0"/>
             </a:br>
             <a:r>
               <a:rPr lang="en-US" sz="7200" dirty="0"/>
-              <a:t>Lesson </a:t>
-            </a:r>
-            <a:r>
-              <a:rPr lang="en-US" sz="7200" dirty="0" smtClean="0"/>
-              <a:t>10: </a:t>
-            </a:r>
-            <a:r>
-              <a:rPr lang="en-US" sz="7200" dirty="0"/>
-              <a:t/>
+              <a:t>Lesson 10: </a:t>
             </a:r>
             <a:br>
               <a:rPr lang="en-US" sz="7200" dirty="0"/>
@@ -13373,6 +13362,191 @@
 </file>
 
 <file path=ppt/slides/slide10.xml><?xml version="1.0" encoding="utf-8"?>
+<p:sld xmlns:a="http://schemas.openxmlformats.org/drawingml/2006/main" xmlns:r="http://schemas.openxmlformats.org/officeDocument/2006/relationships" xmlns:p="http://schemas.openxmlformats.org/presentationml/2006/main">
+  <p:cSld>
+    <p:spTree>
+      <p:nvGrpSpPr>
+        <p:cNvPr id="1" name=""/>
+        <p:cNvGrpSpPr/>
+        <p:nvPr/>
+      </p:nvGrpSpPr>
+      <p:grpSpPr>
+        <a:xfrm>
+          <a:off x="0" y="0"/>
+          <a:ext cx="0" cy="0"/>
+          <a:chOff x="0" y="0"/>
+          <a:chExt cx="0" cy="0"/>
+        </a:xfrm>
+      </p:grpSpPr>
+      <p:sp>
+        <p:nvSpPr>
+          <p:cNvPr id="2" name="Title 1"/>
+          <p:cNvSpPr>
+            <a:spLocks noGrp="1"/>
+          </p:cNvSpPr>
+          <p:nvPr>
+            <p:ph type="title"/>
+          </p:nvPr>
+        </p:nvSpPr>
+        <p:spPr/>
+        <p:txBody>
+          <a:bodyPr/>
+          <a:lstStyle/>
+          <a:p>
+            <a:r>
+              <a:rPr lang="en-US" dirty="0"/>
+              <a:t>Topic Exchange</a:t>
+            </a:r>
+          </a:p>
+        </p:txBody>
+      </p:sp>
+      <p:sp>
+        <p:nvSpPr>
+          <p:cNvPr id="3" name="Content Placeholder 2"/>
+          <p:cNvSpPr>
+            <a:spLocks noGrp="1"/>
+          </p:cNvSpPr>
+          <p:nvPr>
+            <p:ph idx="1"/>
+          </p:nvPr>
+        </p:nvSpPr>
+        <p:spPr>
+          <a:xfrm>
+            <a:off x="190919" y="1825625"/>
+            <a:ext cx="11836958" cy="4866577"/>
+          </a:xfrm>
+        </p:spPr>
+        <p:txBody>
+          <a:bodyPr>
+            <a:normAutofit lnSpcReduction="10000"/>
+          </a:bodyPr>
+          <a:lstStyle/>
+          <a:p>
+            <a:r>
+              <a:rPr lang="en-US" dirty="0"/>
+              <a:t>Broadcast like Direct Exchange</a:t>
+            </a:r>
+          </a:p>
+          <a:p>
+            <a:r>
+              <a:rPr lang="en-US" dirty="0"/>
+              <a:t>But finer grained way to specify routing to queues</a:t>
+            </a:r>
+          </a:p>
+          <a:p>
+            <a:r>
+              <a:rPr lang="en-US" i="1" dirty="0"/>
+              <a:t>Topic</a:t>
+            </a:r>
+            <a:r>
+              <a:rPr lang="en-US" dirty="0"/>
+              <a:t>: list of words separated by “</a:t>
+            </a:r>
+            <a:r>
+              <a:rPr lang="en-US" b="1" dirty="0"/>
+              <a:t>.</a:t>
+            </a:r>
+            <a:r>
+              <a:rPr lang="en-US" dirty="0"/>
+              <a:t>”</a:t>
+            </a:r>
+          </a:p>
+          <a:p>
+            <a:r>
+              <a:rPr lang="en-US" dirty="0"/>
+              <a:t>Receiver specifies the topic it wants to pull for</a:t>
+            </a:r>
+          </a:p>
+          <a:p>
+            <a:r>
+              <a:rPr lang="en-US" dirty="0"/>
+              <a:t>Special symbols: “</a:t>
+            </a:r>
+            <a:r>
+              <a:rPr lang="en-US" b="1" dirty="0"/>
+              <a:t>*</a:t>
+            </a:r>
+            <a:r>
+              <a:rPr lang="en-US" dirty="0"/>
+              <a:t>” substitutes 1 word, “</a:t>
+            </a:r>
+            <a:r>
+              <a:rPr lang="en-US" b="1" dirty="0"/>
+              <a:t>#</a:t>
+            </a:r>
+            <a:r>
+              <a:rPr lang="en-US" dirty="0"/>
+              <a:t>” substitute 0 or more words</a:t>
+            </a:r>
+          </a:p>
+          <a:p>
+            <a:r>
+              <a:rPr lang="en-US" dirty="0"/>
+              <a:t>Ex, consider topic “</a:t>
+            </a:r>
+            <a:r>
+              <a:rPr lang="en-US" i="1" dirty="0" err="1"/>
+              <a:t>author.country.kind</a:t>
+            </a:r>
+            <a:r>
+              <a:rPr lang="en-US" dirty="0"/>
+              <a:t>” for news</a:t>
+            </a:r>
+          </a:p>
+          <a:p>
+            <a:pPr lvl="1"/>
+            <a:r>
+              <a:rPr lang="en-US" dirty="0"/>
+              <a:t>“</a:t>
+            </a:r>
+            <a:r>
+              <a:rPr lang="en-US" i="1" dirty="0"/>
+              <a:t>*.</a:t>
+            </a:r>
+            <a:r>
+              <a:rPr lang="en-US" i="1" dirty="0" err="1"/>
+              <a:t>norway</a:t>
+            </a:r>
+            <a:r>
+              <a:rPr lang="en-US" i="1" dirty="0"/>
+              <a:t>.*</a:t>
+            </a:r>
+            <a:r>
+              <a:rPr lang="en-US" dirty="0"/>
+              <a:t>”: any news from Norway, regardless of author or kind</a:t>
+            </a:r>
+          </a:p>
+          <a:p>
+            <a:pPr lvl="1"/>
+            <a:r>
+              <a:rPr lang="en-US" dirty="0"/>
+              <a:t>“</a:t>
+            </a:r>
+            <a:r>
+              <a:rPr lang="en-US" i="1" dirty="0"/>
+              <a:t>smith.#</a:t>
+            </a:r>
+            <a:r>
+              <a:rPr lang="en-US" dirty="0"/>
+              <a:t>”: any news from author Smith</a:t>
+            </a:r>
+          </a:p>
+        </p:txBody>
+      </p:sp>
+    </p:spTree>
+    <p:extLst>
+      <p:ext uri="{BB962C8B-B14F-4D97-AF65-F5344CB8AC3E}">
+        <p14:creationId xmlns:p14="http://schemas.microsoft.com/office/powerpoint/2010/main" val="1031992537"/>
+      </p:ext>
+    </p:extLst>
+  </p:cSld>
+  <p:clrMapOvr>
+    <a:masterClrMapping/>
+  </p:clrMapOvr>
+</p:sld>
+</file>
+
+<file path=ppt/slides/slide11.xml><?xml version="1.0" encoding="utf-8"?>
 <p:sld xmlns:a="http://schemas.openxmlformats.org/drawingml/2006/main" xmlns:r="http://schemas.openxmlformats.org/officeDocument/2006/relationships" xmlns:p="http://schemas.openxmlformats.org/presentationml/2006/main">
   <p:cSld>
     <p:spTree>
@@ -15778,6 +15952,179 @@
 </file>
 
 <file path=ppt/slides/slide7.xml><?xml version="1.0" encoding="utf-8"?>
+<p:sld xmlns:a="http://schemas.openxmlformats.org/drawingml/2006/main" xmlns:r="http://schemas.openxmlformats.org/officeDocument/2006/relationships" xmlns:p="http://schemas.openxmlformats.org/presentationml/2006/main">
+  <p:cSld>
+    <p:spTree>
+      <p:nvGrpSpPr>
+        <p:cNvPr id="1" name=""/>
+        <p:cNvGrpSpPr/>
+        <p:nvPr/>
+      </p:nvGrpSpPr>
+      <p:grpSpPr>
+        <a:xfrm>
+          <a:off x="0" y="0"/>
+          <a:ext cx="0" cy="0"/>
+          <a:chOff x="0" y="0"/>
+          <a:chExt cx="0" cy="0"/>
+        </a:xfrm>
+      </p:grpSpPr>
+      <p:sp>
+        <p:nvSpPr>
+          <p:cNvPr id="2" name="Title 1">
+            <a:extLst>
+              <a:ext uri="{FF2B5EF4-FFF2-40B4-BE49-F238E27FC236}">
+                <a16:creationId xmlns:a16="http://schemas.microsoft.com/office/drawing/2014/main" id="{8929B19C-EE2C-674B-8B7F-F71FB569A691}"/>
+              </a:ext>
+            </a:extLst>
+          </p:cNvPr>
+          <p:cNvSpPr>
+            <a:spLocks noGrp="1"/>
+          </p:cNvSpPr>
+          <p:nvPr>
+            <p:ph type="title"/>
+          </p:nvPr>
+        </p:nvSpPr>
+        <p:spPr/>
+        <p:txBody>
+          <a:bodyPr/>
+          <a:lstStyle/>
+          <a:p>
+            <a:r>
+              <a:rPr lang="en-US" dirty="0" err="1"/>
+              <a:t>PreFetching</a:t>
+            </a:r>
+            <a:endParaRPr lang="en-US" dirty="0"/>
+          </a:p>
+        </p:txBody>
+      </p:sp>
+      <p:sp>
+        <p:nvSpPr>
+          <p:cNvPr id="3" name="Content Placeholder 2">
+            <a:extLst>
+              <a:ext uri="{FF2B5EF4-FFF2-40B4-BE49-F238E27FC236}">
+                <a16:creationId xmlns:a16="http://schemas.microsoft.com/office/drawing/2014/main" id="{9C9AE871-137E-4A45-A4C7-964CB43FD7FE}"/>
+              </a:ext>
+            </a:extLst>
+          </p:cNvPr>
+          <p:cNvSpPr>
+            <a:spLocks noGrp="1"/>
+          </p:cNvSpPr>
+          <p:nvPr>
+            <p:ph idx="1"/>
+          </p:nvPr>
+        </p:nvSpPr>
+        <p:spPr>
+          <a:xfrm>
+            <a:off x="275207" y="1825624"/>
+            <a:ext cx="11754035" cy="4894771"/>
+          </a:xfrm>
+        </p:spPr>
+        <p:txBody>
+          <a:bodyPr/>
+          <a:lstStyle/>
+          <a:p>
+            <a:r>
+              <a:rPr lang="en-US" dirty="0"/>
+              <a:t>Communicating with AMQP has a cost, as connection on network, </a:t>
+            </a:r>
+            <a:r>
+              <a:rPr lang="en-US" dirty="0" err="1"/>
+              <a:t>eg</a:t>
+            </a:r>
+            <a:r>
+              <a:rPr lang="en-US" dirty="0"/>
+              <a:t>, cost() =  </a:t>
+            </a:r>
+            <a:r>
+              <a:rPr lang="en-US" b="1" dirty="0"/>
+              <a:t>X + (m * Y)</a:t>
+            </a:r>
+          </a:p>
+          <a:p>
+            <a:pPr lvl="1"/>
+            <a:r>
+              <a:rPr lang="en-US" b="1" dirty="0"/>
+              <a:t>X</a:t>
+            </a:r>
+            <a:r>
+              <a:rPr lang="en-US" dirty="0"/>
+              <a:t>: some constant cost of the connection</a:t>
+            </a:r>
+          </a:p>
+          <a:p>
+            <a:pPr lvl="1"/>
+            <a:r>
+              <a:rPr lang="en-US" b="1" dirty="0"/>
+              <a:t>Y</a:t>
+            </a:r>
+            <a:r>
+              <a:rPr lang="en-US" dirty="0"/>
+              <a:t>: cost per message</a:t>
+            </a:r>
+          </a:p>
+          <a:p>
+            <a:pPr lvl="1"/>
+            <a:r>
+              <a:rPr lang="en-US" b="1" dirty="0"/>
+              <a:t>m</a:t>
+            </a:r>
+            <a:r>
+              <a:rPr lang="en-US" dirty="0"/>
+              <a:t>: number of messages that are fetched</a:t>
+            </a:r>
+          </a:p>
+          <a:p>
+            <a:r>
+              <a:rPr lang="en-US" dirty="0"/>
+              <a:t>Typically, </a:t>
+            </a:r>
+            <a:r>
+              <a:rPr lang="en-US" b="1" dirty="0"/>
+              <a:t>Y</a:t>
+            </a:r>
+            <a:r>
+              <a:rPr lang="en-US" dirty="0"/>
+              <a:t> is small compared to </a:t>
+            </a:r>
+            <a:r>
+              <a:rPr lang="en-US" b="1" dirty="0"/>
+              <a:t>X</a:t>
+            </a:r>
+            <a:r>
+              <a:rPr lang="en-US" dirty="0"/>
+              <a:t> </a:t>
+            </a:r>
+          </a:p>
+          <a:p>
+            <a:r>
+              <a:rPr lang="en-US" dirty="0"/>
+              <a:t>It is hence common to read several </a:t>
+            </a:r>
+            <a:r>
+              <a:rPr lang="en-US" b="1" dirty="0"/>
+              <a:t>m</a:t>
+            </a:r>
+            <a:r>
+              <a:rPr lang="en-US" dirty="0"/>
+              <a:t> messages on a queue from same client, in one go</a:t>
+            </a:r>
+          </a:p>
+        </p:txBody>
+      </p:sp>
+    </p:spTree>
+    <p:extLst>
+      <p:ext uri="{BB962C8B-B14F-4D97-AF65-F5344CB8AC3E}">
+        <p14:creationId xmlns:p14="http://schemas.microsoft.com/office/powerpoint/2010/main" val="2189712904"/>
+      </p:ext>
+    </p:extLst>
+  </p:cSld>
+  <p:clrMapOvr>
+    <a:masterClrMapping/>
+  </p:clrMapOvr>
+</p:sld>
+</file>
+
+<file path=ppt/slides/slide8.xml><?xml version="1.0" encoding="utf-8"?>
 <p:sld xmlns:a="http://schemas.openxmlformats.org/drawingml/2006/main" xmlns:r="http://schemas.openxmlformats.org/officeDocument/2006/relationships" xmlns:p="http://schemas.openxmlformats.org/presentationml/2006/main">
   <p:cSld>
     <p:spTree>
@@ -16673,7 +17020,7 @@
 </p:sld>
 </file>
 
-<file path=ppt/slides/slide8.xml><?xml version="1.0" encoding="utf-8"?>
+<file path=ppt/slides/slide9.xml><?xml version="1.0" encoding="utf-8"?>
 <p:sld xmlns:a="http://schemas.openxmlformats.org/drawingml/2006/main" xmlns:r="http://schemas.openxmlformats.org/officeDocument/2006/relationships" xmlns:p="http://schemas.openxmlformats.org/presentationml/2006/main">
   <p:cSld>
     <p:spTree>
@@ -17627,191 +17974,6 @@
     <p:extLst>
       <p:ext uri="{BB962C8B-B14F-4D97-AF65-F5344CB8AC3E}">
         <p14:creationId xmlns:p14="http://schemas.microsoft.com/office/powerpoint/2010/main" val="1726382790"/>
-      </p:ext>
-    </p:extLst>
-  </p:cSld>
-  <p:clrMapOvr>
-    <a:masterClrMapping/>
-  </p:clrMapOvr>
-</p:sld>
-</file>
-
-<file path=ppt/slides/slide9.xml><?xml version="1.0" encoding="utf-8"?>
-<p:sld xmlns:a="http://schemas.openxmlformats.org/drawingml/2006/main" xmlns:r="http://schemas.openxmlformats.org/officeDocument/2006/relationships" xmlns:p="http://schemas.openxmlformats.org/presentationml/2006/main">
-  <p:cSld>
-    <p:spTree>
-      <p:nvGrpSpPr>
-        <p:cNvPr id="1" name=""/>
-        <p:cNvGrpSpPr/>
-        <p:nvPr/>
-      </p:nvGrpSpPr>
-      <p:grpSpPr>
-        <a:xfrm>
-          <a:off x="0" y="0"/>
-          <a:ext cx="0" cy="0"/>
-          <a:chOff x="0" y="0"/>
-          <a:chExt cx="0" cy="0"/>
-        </a:xfrm>
-      </p:grpSpPr>
-      <p:sp>
-        <p:nvSpPr>
-          <p:cNvPr id="2" name="Title 1"/>
-          <p:cNvSpPr>
-            <a:spLocks noGrp="1"/>
-          </p:cNvSpPr>
-          <p:nvPr>
-            <p:ph type="title"/>
-          </p:nvPr>
-        </p:nvSpPr>
-        <p:spPr/>
-        <p:txBody>
-          <a:bodyPr/>
-          <a:lstStyle/>
-          <a:p>
-            <a:r>
-              <a:rPr lang="en-US" dirty="0"/>
-              <a:t>Topic Exchange</a:t>
-            </a:r>
-          </a:p>
-        </p:txBody>
-      </p:sp>
-      <p:sp>
-        <p:nvSpPr>
-          <p:cNvPr id="3" name="Content Placeholder 2"/>
-          <p:cNvSpPr>
-            <a:spLocks noGrp="1"/>
-          </p:cNvSpPr>
-          <p:nvPr>
-            <p:ph idx="1"/>
-          </p:nvPr>
-        </p:nvSpPr>
-        <p:spPr>
-          <a:xfrm>
-            <a:off x="190919" y="1825625"/>
-            <a:ext cx="11836958" cy="4866577"/>
-          </a:xfrm>
-        </p:spPr>
-        <p:txBody>
-          <a:bodyPr>
-            <a:normAutofit lnSpcReduction="10000"/>
-          </a:bodyPr>
-          <a:lstStyle/>
-          <a:p>
-            <a:r>
-              <a:rPr lang="en-US" dirty="0"/>
-              <a:t>Broadcast like Direct Exchange</a:t>
-            </a:r>
-          </a:p>
-          <a:p>
-            <a:r>
-              <a:rPr lang="en-US" dirty="0"/>
-              <a:t>But finer grained way to specify routing to queues</a:t>
-            </a:r>
-          </a:p>
-          <a:p>
-            <a:r>
-              <a:rPr lang="en-US" i="1" dirty="0"/>
-              <a:t>Topic</a:t>
-            </a:r>
-            <a:r>
-              <a:rPr lang="en-US" dirty="0"/>
-              <a:t>: list of words separated by “</a:t>
-            </a:r>
-            <a:r>
-              <a:rPr lang="en-US" b="1" dirty="0"/>
-              <a:t>.</a:t>
-            </a:r>
-            <a:r>
-              <a:rPr lang="en-US" dirty="0"/>
-              <a:t>”</a:t>
-            </a:r>
-          </a:p>
-          <a:p>
-            <a:r>
-              <a:rPr lang="en-US" dirty="0"/>
-              <a:t>Receiver specifies the topic it wants to pull for</a:t>
-            </a:r>
-          </a:p>
-          <a:p>
-            <a:r>
-              <a:rPr lang="en-US" dirty="0"/>
-              <a:t>Special symbols: “</a:t>
-            </a:r>
-            <a:r>
-              <a:rPr lang="en-US" b="1" dirty="0"/>
-              <a:t>*</a:t>
-            </a:r>
-            <a:r>
-              <a:rPr lang="en-US" dirty="0"/>
-              <a:t>” substitutes 1 word, “</a:t>
-            </a:r>
-            <a:r>
-              <a:rPr lang="en-US" b="1" dirty="0"/>
-              <a:t>#</a:t>
-            </a:r>
-            <a:r>
-              <a:rPr lang="en-US" dirty="0"/>
-              <a:t>” substitute 0 or more words</a:t>
-            </a:r>
-          </a:p>
-          <a:p>
-            <a:r>
-              <a:rPr lang="en-US" dirty="0"/>
-              <a:t>Ex, consider topic “</a:t>
-            </a:r>
-            <a:r>
-              <a:rPr lang="en-US" i="1" dirty="0" err="1"/>
-              <a:t>author.country.kind</a:t>
-            </a:r>
-            <a:r>
-              <a:rPr lang="en-US" dirty="0"/>
-              <a:t>” for news</a:t>
-            </a:r>
-          </a:p>
-          <a:p>
-            <a:pPr lvl="1"/>
-            <a:r>
-              <a:rPr lang="en-US" dirty="0"/>
-              <a:t>“</a:t>
-            </a:r>
-            <a:r>
-              <a:rPr lang="en-US" i="1" dirty="0"/>
-              <a:t>*.</a:t>
-            </a:r>
-            <a:r>
-              <a:rPr lang="en-US" i="1" dirty="0" err="1"/>
-              <a:t>norway</a:t>
-            </a:r>
-            <a:r>
-              <a:rPr lang="en-US" i="1" dirty="0"/>
-              <a:t>.*</a:t>
-            </a:r>
-            <a:r>
-              <a:rPr lang="en-US" dirty="0"/>
-              <a:t>”: any news from Norway, regardless of author or kind</a:t>
-            </a:r>
-          </a:p>
-          <a:p>
-            <a:pPr lvl="1"/>
-            <a:r>
-              <a:rPr lang="en-US" dirty="0"/>
-              <a:t>“</a:t>
-            </a:r>
-            <a:r>
-              <a:rPr lang="en-US" i="1" dirty="0"/>
-              <a:t>smith.#</a:t>
-            </a:r>
-            <a:r>
-              <a:rPr lang="en-US" dirty="0"/>
-              <a:t>”: any news from author Smith</a:t>
-            </a:r>
-          </a:p>
-        </p:txBody>
-      </p:sp>
-    </p:spTree>
-    <p:extLst>
-      <p:ext uri="{BB962C8B-B14F-4D97-AF65-F5344CB8AC3E}">
-        <p14:creationId xmlns:p14="http://schemas.microsoft.com/office/powerpoint/2010/main" val="1031992537"/>
       </p:ext>
     </p:extLst>
   </p:cSld>

</xml_diff>